<commit_message>
Présentation + RFC 1.2 + Design
</commit_message>
<xml_diff>
--- a/ConceptionRType.pptx
+++ b/ConceptionRType.pptx
@@ -11,6 +11,8 @@
     <p:sldId id="259" r:id="rId5"/>
     <p:sldId id="260" r:id="rId6"/>
     <p:sldId id="261" r:id="rId7"/>
+    <p:sldId id="262" r:id="rId8"/>
+    <p:sldId id="263" r:id="rId9"/>
   </p:sldIdLst>
   <p:sldSz cx="12192000" cy="6858000"/>
   <p:notesSz cx="6858000" cy="9144000"/>
@@ -109,6 +111,11 @@
       </a:defRPr>
     </a:lvl9pPr>
   </p:defaultTextStyle>
+  <p:extLst>
+    <p:ext uri="{EFAFB233-063F-42B5-8137-9DF3F51BA10A}">
+      <p15:sldGuideLst xmlns:p15="http://schemas.microsoft.com/office/powerpoint/2012/main"/>
+    </p:ext>
+  </p:extLst>
 </p:presentation>
 </file>
 
@@ -6307,6 +6314,291 @@
 </p:sld>
 </file>
 
+<file path=ppt/slides/slide7.xml><?xml version="1.0" encoding="utf-8"?>
+<p:sld xmlns:a="http://schemas.openxmlformats.org/drawingml/2006/main" xmlns:r="http://schemas.openxmlformats.org/officeDocument/2006/relationships" xmlns:p="http://schemas.openxmlformats.org/presentationml/2006/main">
+  <p:cSld>
+    <p:spTree>
+      <p:nvGrpSpPr>
+        <p:cNvPr id="1" name=""/>
+        <p:cNvGrpSpPr/>
+        <p:nvPr/>
+      </p:nvGrpSpPr>
+      <p:grpSpPr>
+        <a:xfrm>
+          <a:off x="0" y="0"/>
+          <a:ext cx="0" cy="0"/>
+          <a:chOff x="0" y="0"/>
+          <a:chExt cx="0" cy="0"/>
+        </a:xfrm>
+      </p:grpSpPr>
+      <p:sp>
+        <p:nvSpPr>
+          <p:cNvPr id="2" name="Titre 1"/>
+          <p:cNvSpPr>
+            <a:spLocks noGrp="1"/>
+          </p:cNvSpPr>
+          <p:nvPr>
+            <p:ph type="title"/>
+          </p:nvPr>
+        </p:nvSpPr>
+        <p:spPr/>
+        <p:txBody>
+          <a:bodyPr/>
+          <a:lstStyle/>
+          <a:p>
+            <a:r>
+              <a:rPr lang="fr-FR" dirty="0"/>
+              <a:t>Gestion du groupe</a:t>
+            </a:r>
+          </a:p>
+        </p:txBody>
+      </p:sp>
+      <p:pic>
+        <p:nvPicPr>
+          <p:cNvPr id="1026" name="Picture 2" descr="Afficher l'image d'origine"/>
+          <p:cNvPicPr>
+            <a:picLocks noGrp="1" noChangeAspect="1" noChangeArrowheads="1"/>
+          </p:cNvPicPr>
+          <p:nvPr>
+            <p:ph idx="1"/>
+          </p:nvPr>
+        </p:nvPicPr>
+        <p:blipFill>
+          <a:blip r:embed="rId2">
+            <a:biLevel thresh="25000"/>
+            <a:extLst>
+              <a:ext uri="{28A0092B-C50C-407E-A947-70E740481C1C}">
+                <a14:useLocalDpi xmlns:a14="http://schemas.microsoft.com/office/drawing/2010/main" val="0"/>
+              </a:ext>
+            </a:extLst>
+          </a:blip>
+          <a:srcRect/>
+          <a:stretch>
+            <a:fillRect/>
+          </a:stretch>
+        </p:blipFill>
+        <p:spPr bwMode="auto">
+          <a:xfrm>
+            <a:off x="838200" y="2059070"/>
+            <a:ext cx="3668467" cy="1169324"/>
+          </a:xfrm>
+          <a:prstGeom prst="rect">
+            <a:avLst/>
+          </a:prstGeom>
+          <a:noFill/>
+          <a:extLst>
+            <a:ext uri="{909E8E84-426E-40DD-AFC4-6F175D3DCCD1}">
+              <a14:hiddenFill xmlns:a14="http://schemas.microsoft.com/office/drawing/2010/main">
+                <a:solidFill>
+                  <a:srgbClr val="FFFFFF"/>
+                </a:solidFill>
+              </a14:hiddenFill>
+            </a:ext>
+          </a:extLst>
+        </p:spPr>
+      </p:pic>
+      <p:pic>
+        <p:nvPicPr>
+          <p:cNvPr id="1028" name="Picture 4" descr="Afficher l'image d'origine"/>
+          <p:cNvPicPr>
+            <a:picLocks noChangeAspect="1" noChangeArrowheads="1"/>
+          </p:cNvPicPr>
+          <p:nvPr/>
+        </p:nvPicPr>
+        <p:blipFill>
+          <a:blip r:embed="rId3">
+            <a:extLst>
+              <a:ext uri="{28A0092B-C50C-407E-A947-70E740481C1C}">
+                <a14:useLocalDpi xmlns:a14="http://schemas.microsoft.com/office/drawing/2010/main" val="0"/>
+              </a:ext>
+            </a:extLst>
+          </a:blip>
+          <a:srcRect/>
+          <a:stretch>
+            <a:fillRect/>
+          </a:stretch>
+        </p:blipFill>
+        <p:spPr bwMode="auto">
+          <a:xfrm>
+            <a:off x="6736702" y="1329077"/>
+            <a:ext cx="3163078" cy="2629309"/>
+          </a:xfrm>
+          <a:prstGeom prst="rect">
+            <a:avLst/>
+          </a:prstGeom>
+          <a:noFill/>
+          <a:extLst>
+            <a:ext uri="{909E8E84-426E-40DD-AFC4-6F175D3DCCD1}">
+              <a14:hiddenFill xmlns:a14="http://schemas.microsoft.com/office/drawing/2010/main">
+                <a:solidFill>
+                  <a:srgbClr val="FFFFFF"/>
+                </a:solidFill>
+              </a14:hiddenFill>
+            </a:ext>
+          </a:extLst>
+        </p:spPr>
+      </p:pic>
+      <p:pic>
+        <p:nvPicPr>
+          <p:cNvPr id="1030" name="Picture 6" descr="Afficher l'image d'origine"/>
+          <p:cNvPicPr>
+            <a:picLocks noChangeAspect="1" noChangeArrowheads="1"/>
+          </p:cNvPicPr>
+          <p:nvPr/>
+        </p:nvPicPr>
+        <p:blipFill>
+          <a:blip r:embed="rId4">
+            <a:biLevel thresh="25000"/>
+            <a:extLst>
+              <a:ext uri="{28A0092B-C50C-407E-A947-70E740481C1C}">
+                <a14:useLocalDpi xmlns:a14="http://schemas.microsoft.com/office/drawing/2010/main" val="0"/>
+              </a:ext>
+            </a:extLst>
+          </a:blip>
+          <a:srcRect/>
+          <a:stretch>
+            <a:fillRect/>
+          </a:stretch>
+        </p:blipFill>
+        <p:spPr bwMode="auto">
+          <a:xfrm>
+            <a:off x="4347279" y="3721359"/>
+            <a:ext cx="2548812" cy="2548812"/>
+          </a:xfrm>
+          <a:prstGeom prst="rect">
+            <a:avLst/>
+          </a:prstGeom>
+          <a:noFill/>
+          <a:extLst>
+            <a:ext uri="{909E8E84-426E-40DD-AFC4-6F175D3DCCD1}">
+              <a14:hiddenFill xmlns:a14="http://schemas.microsoft.com/office/drawing/2010/main">
+                <a:solidFill>
+                  <a:srgbClr val="FFFFFF"/>
+                </a:solidFill>
+              </a14:hiddenFill>
+            </a:ext>
+          </a:extLst>
+        </p:spPr>
+      </p:pic>
+    </p:spTree>
+    <p:extLst>
+      <p:ext uri="{BB962C8B-B14F-4D97-AF65-F5344CB8AC3E}">
+        <p14:creationId xmlns:p14="http://schemas.microsoft.com/office/powerpoint/2010/main" val="1561861900"/>
+      </p:ext>
+    </p:extLst>
+  </p:cSld>
+  <p:clrMapOvr>
+    <a:masterClrMapping/>
+  </p:clrMapOvr>
+</p:sld>
+</file>
+
+<file path=ppt/slides/slide8.xml><?xml version="1.0" encoding="utf-8"?>
+<p:sld xmlns:a="http://schemas.openxmlformats.org/drawingml/2006/main" xmlns:r="http://schemas.openxmlformats.org/officeDocument/2006/relationships" xmlns:p="http://schemas.openxmlformats.org/presentationml/2006/main">
+  <p:cSld>
+    <p:spTree>
+      <p:nvGrpSpPr>
+        <p:cNvPr id="1" name=""/>
+        <p:cNvGrpSpPr/>
+        <p:nvPr/>
+      </p:nvGrpSpPr>
+      <p:grpSpPr>
+        <a:xfrm>
+          <a:off x="0" y="0"/>
+          <a:ext cx="0" cy="0"/>
+          <a:chOff x="0" y="0"/>
+          <a:chExt cx="0" cy="0"/>
+        </a:xfrm>
+      </p:grpSpPr>
+      <p:sp>
+        <p:nvSpPr>
+          <p:cNvPr id="2" name="Titre 1"/>
+          <p:cNvSpPr>
+            <a:spLocks noGrp="1"/>
+          </p:cNvSpPr>
+          <p:nvPr>
+            <p:ph type="title"/>
+          </p:nvPr>
+        </p:nvSpPr>
+        <p:spPr/>
+        <p:txBody>
+          <a:bodyPr/>
+          <a:lstStyle/>
+          <a:p>
+            <a:r>
+              <a:rPr lang="fr-FR" dirty="0"/>
+              <a:t>Répartition des tâches</a:t>
+            </a:r>
+          </a:p>
+        </p:txBody>
+      </p:sp>
+      <p:sp>
+        <p:nvSpPr>
+          <p:cNvPr id="3" name="Espace réservé du contenu 2"/>
+          <p:cNvSpPr>
+            <a:spLocks noGrp="1"/>
+          </p:cNvSpPr>
+          <p:nvPr>
+            <p:ph idx="1"/>
+          </p:nvPr>
+        </p:nvSpPr>
+        <p:spPr/>
+        <p:txBody>
+          <a:bodyPr/>
+          <a:lstStyle/>
+          <a:p>
+            <a:r>
+              <a:rPr lang="fr-FR" dirty="0"/>
+              <a:t>Client / GUI : Simon BERTHO &amp; Antonin OGER</a:t>
+            </a:r>
+          </a:p>
+          <a:p>
+            <a:endParaRPr lang="fr-FR" dirty="0"/>
+          </a:p>
+          <a:p>
+            <a:r>
+              <a:rPr lang="fr-FR" dirty="0"/>
+              <a:t>Réseaux : Julien DUFRENE &amp; Maxime LECOQ</a:t>
+            </a:r>
+          </a:p>
+          <a:p>
+            <a:endParaRPr lang="fr-FR" dirty="0"/>
+          </a:p>
+          <a:p>
+            <a:r>
+              <a:rPr lang="fr-FR" dirty="0"/>
+              <a:t>Serveur : Maxime BACONNAIS, Maxime LECOQ </a:t>
+            </a:r>
+          </a:p>
+          <a:p>
+            <a:pPr marL="914400" lvl="2" indent="0">
+              <a:buNone/>
+            </a:pPr>
+            <a:r>
+              <a:rPr lang="fr-FR" dirty="0"/>
+              <a:t>		</a:t>
+            </a:r>
+            <a:r>
+              <a:rPr lang="fr-FR" sz="2800" dirty="0"/>
+              <a:t>&amp; Guilhem REMBURRE</a:t>
+            </a:r>
+            <a:endParaRPr lang="fr-FR" dirty="0"/>
+          </a:p>
+        </p:txBody>
+      </p:sp>
+    </p:spTree>
+    <p:extLst>
+      <p:ext uri="{BB962C8B-B14F-4D97-AF65-F5344CB8AC3E}">
+        <p14:creationId xmlns:p14="http://schemas.microsoft.com/office/powerpoint/2010/main" val="1201581602"/>
+      </p:ext>
+    </p:extLst>
+  </p:cSld>
+  <p:clrMapOvr>
+    <a:masterClrMapping/>
+  </p:clrMapOvr>
+</p:sld>
+</file>
+
 <file path=ppt/theme/theme1.xml><?xml version="1.0" encoding="utf-8"?>
 <a:theme xmlns:a="http://schemas.openxmlformats.org/drawingml/2006/main" name="Profondeur">
   <a:themeElements>

</xml_diff>